<commit_message>
updated all the Design artifacts.
</commit_message>
<xml_diff>
--- a/Architecture design artifacts/JPM_presentation.pptx
+++ b/Architecture design artifacts/JPM_presentation.pptx
@@ -8,18 +8,19 @@
     <p:notesMasterId r:id="rId4"/>
   </p:notesMasterIdLst>
   <p:handoutMasterIdLst>
-    <p:handoutMasterId r:id="rId13"/>
+    <p:handoutMasterId r:id="rId14"/>
   </p:handoutMasterIdLst>
   <p:sldIdLst>
     <p:sldId id="256" r:id="rId3"/>
     <p:sldId id="257" r:id="rId5"/>
     <p:sldId id="258" r:id="rId6"/>
     <p:sldId id="259" r:id="rId7"/>
-    <p:sldId id="260" r:id="rId8"/>
-    <p:sldId id="261" r:id="rId9"/>
-    <p:sldId id="262" r:id="rId10"/>
-    <p:sldId id="263" r:id="rId11"/>
-    <p:sldId id="264" r:id="rId12"/>
+    <p:sldId id="265" r:id="rId8"/>
+    <p:sldId id="260" r:id="rId9"/>
+    <p:sldId id="261" r:id="rId10"/>
+    <p:sldId id="262" r:id="rId11"/>
+    <p:sldId id="263" r:id="rId12"/>
+    <p:sldId id="264" r:id="rId13"/>
   </p:sldIdLst>
   <p:sldSz cx="12192000" cy="6858000"/>
   <p:notesSz cx="7103745" cy="10234295"/>
@@ -3603,6 +3604,64 @@
 </p:sld>
 </file>
 
+<file path=ppt/slides/slide10.xml><?xml version="1.0" encoding="utf-8"?>
+<p:sld xmlns:a="http://schemas.openxmlformats.org/drawingml/2006/main" xmlns:r="http://schemas.openxmlformats.org/officeDocument/2006/relationships" xmlns:p="http://schemas.openxmlformats.org/presentationml/2006/main">
+  <p:cSld>
+    <p:spTree>
+      <p:nvGrpSpPr>
+        <p:cNvPr id="1" name=""/>
+        <p:cNvGrpSpPr/>
+        <p:nvPr/>
+      </p:nvGrpSpPr>
+      <p:grpSpPr/>
+      <p:sp>
+        <p:nvSpPr>
+          <p:cNvPr id="2" name="Title 1"/>
+          <p:cNvSpPr>
+            <a:spLocks noGrp="1"/>
+          </p:cNvSpPr>
+          <p:nvPr>
+            <p:ph type="title"/>
+          </p:nvPr>
+        </p:nvSpPr>
+        <p:spPr/>
+        <p:txBody>
+          <a:bodyPr/>
+          <a:p>
+            <a:r>
+              <a:rPr lang="en-US"/>
+              <a:t>Thank you</a:t>
+            </a:r>
+            <a:endParaRPr lang="en-US"/>
+          </a:p>
+        </p:txBody>
+      </p:sp>
+      <p:sp>
+        <p:nvSpPr>
+          <p:cNvPr id="3" name="Content Placeholder 2"/>
+          <p:cNvSpPr>
+            <a:spLocks noGrp="1"/>
+          </p:cNvSpPr>
+          <p:nvPr>
+            <p:ph idx="1"/>
+          </p:nvPr>
+        </p:nvSpPr>
+        <p:spPr/>
+        <p:txBody>
+          <a:bodyPr/>
+          <a:p>
+            <a:endParaRPr lang="en-US"/>
+          </a:p>
+        </p:txBody>
+      </p:sp>
+    </p:spTree>
+  </p:cSld>
+  <p:clrMapOvr>
+    <a:masterClrMapping/>
+  </p:clrMapOvr>
+</p:sld>
+</file>
+
 <file path=ppt/slides/slide2.xml><?xml version="1.0" encoding="utf-8"?>
 <p:sld xmlns:a="http://schemas.openxmlformats.org/drawingml/2006/main" xmlns:r="http://schemas.openxmlformats.org/officeDocument/2006/relationships" xmlns:p="http://schemas.openxmlformats.org/presentationml/2006/main">
   <p:cSld>
@@ -3818,7 +3877,7 @@
       </p:sp>
       <p:pic>
         <p:nvPicPr>
-          <p:cNvPr id="4" name="Picture 3" descr="Jpm-wm-hld"/>
+          <p:cNvPr id="3" name="Picture 2" descr="1_jpm-wm-hld"/>
           <p:cNvPicPr>
             <a:picLocks noChangeAspect="1"/>
           </p:cNvPicPr>
@@ -3832,8 +3891,8 @@
         </p:blipFill>
         <p:spPr>
           <a:xfrm>
-            <a:off x="2439035" y="986155"/>
-            <a:ext cx="7757795" cy="5711825"/>
+            <a:off x="2173605" y="814070"/>
+            <a:ext cx="9078595" cy="5884545"/>
           </a:xfrm>
           <a:prstGeom prst="rect">
             <a:avLst/>
@@ -3887,6 +3946,30 @@
           </a:p>
         </p:txBody>
       </p:sp>
+      <p:pic>
+        <p:nvPicPr>
+          <p:cNvPr id="3" name="Picture 2" descr="3_jpm-wm_Class-Diagram"/>
+          <p:cNvPicPr>
+            <a:picLocks noChangeAspect="1"/>
+          </p:cNvPicPr>
+          <p:nvPr/>
+        </p:nvPicPr>
+        <p:blipFill>
+          <a:blip r:embed="rId1"/>
+          <a:stretch>
+            <a:fillRect/>
+          </a:stretch>
+        </p:blipFill>
+        <p:spPr>
+          <a:xfrm>
+            <a:off x="5725795" y="478790"/>
+            <a:ext cx="4637405" cy="5657215"/>
+          </a:xfrm>
+          <a:prstGeom prst="rect">
+            <a:avLst/>
+          </a:prstGeom>
+        </p:spPr>
+      </p:pic>
     </p:spTree>
   </p:cSld>
   <p:clrMapOvr>
@@ -3918,7 +4001,7 @@
         <p:spPr>
           <a:xfrm>
             <a:off x="647700" y="258445"/>
-            <a:ext cx="10515600" cy="600710"/>
+            <a:ext cx="10515600" cy="619760"/>
           </a:xfrm>
         </p:spPr>
         <p:txBody>
@@ -3928,30 +4011,36 @@
           <a:p>
             <a:r>
               <a:rPr lang="en-US"/>
-              <a:t>Implementations</a:t>
+              <a:t>Data design</a:t>
             </a:r>
             <a:endParaRPr lang="en-US"/>
           </a:p>
         </p:txBody>
       </p:sp>
-      <p:sp>
-        <p:nvSpPr>
-          <p:cNvPr id="3" name="Content Placeholder 2"/>
-          <p:cNvSpPr>
-            <a:spLocks noGrp="1"/>
-          </p:cNvSpPr>
-          <p:nvPr>
-            <p:ph idx="1"/>
-          </p:nvPr>
-        </p:nvSpPr>
-        <p:spPr/>
-        <p:txBody>
-          <a:bodyPr/>
-          <a:p>
-            <a:endParaRPr lang="en-US"/>
-          </a:p>
-        </p:txBody>
-      </p:sp>
+      <p:pic>
+        <p:nvPicPr>
+          <p:cNvPr id="4" name="Picture 3" descr="2_jpm_data_design_wm"/>
+          <p:cNvPicPr>
+            <a:picLocks noChangeAspect="1"/>
+          </p:cNvPicPr>
+          <p:nvPr/>
+        </p:nvPicPr>
+        <p:blipFill>
+          <a:blip r:embed="rId1"/>
+          <a:stretch>
+            <a:fillRect/>
+          </a:stretch>
+        </p:blipFill>
+        <p:spPr>
+          <a:xfrm>
+            <a:off x="1987550" y="1151255"/>
+            <a:ext cx="7994015" cy="5247640"/>
+          </a:xfrm>
+          <a:prstGeom prst="rect">
+            <a:avLst/>
+          </a:prstGeom>
+        </p:spPr>
+      </p:pic>
     </p:spTree>
   </p:cSld>
   <p:clrMapOvr>
@@ -3983,7 +4072,7 @@
         <p:spPr>
           <a:xfrm>
             <a:off x="647700" y="258445"/>
-            <a:ext cx="10515600" cy="443230"/>
+            <a:ext cx="10515600" cy="600710"/>
           </a:xfrm>
         </p:spPr>
         <p:txBody>
@@ -3993,7 +4082,7 @@
           <a:p>
             <a:r>
               <a:rPr lang="en-US"/>
-              <a:t>Demo:</a:t>
+              <a:t>Implementations</a:t>
             </a:r>
             <a:endParaRPr lang="en-US"/>
           </a:p>
@@ -4048,7 +4137,7 @@
         <p:spPr>
           <a:xfrm>
             <a:off x="647700" y="258445"/>
-            <a:ext cx="10515600" cy="610235"/>
+            <a:ext cx="10515600" cy="443230"/>
           </a:xfrm>
         </p:spPr>
         <p:txBody>
@@ -4058,7 +4147,7 @@
           <a:p>
             <a:r>
               <a:rPr lang="en-US"/>
-              <a:t>Reports</a:t>
+              <a:t>Demo:</a:t>
             </a:r>
             <a:endParaRPr lang="en-US"/>
           </a:p>
@@ -4113,7 +4202,7 @@
         <p:spPr>
           <a:xfrm>
             <a:off x="647700" y="258445"/>
-            <a:ext cx="10515600" cy="550545"/>
+            <a:ext cx="10515600" cy="610235"/>
           </a:xfrm>
         </p:spPr>
         <p:txBody>
@@ -4123,7 +4212,7 @@
           <a:p>
             <a:r>
               <a:rPr lang="en-US"/>
-              <a:t>Monitoring</a:t>
+              <a:t>Reports</a:t>
             </a:r>
             <a:endParaRPr lang="en-US"/>
           </a:p>
@@ -4175,13 +4264,20 @@
             <p:ph type="title"/>
           </p:nvPr>
         </p:nvSpPr>
-        <p:spPr/>
-        <p:txBody>
-          <a:bodyPr/>
+        <p:spPr>
+          <a:xfrm>
+            <a:off x="647700" y="258445"/>
+            <a:ext cx="10515600" cy="550545"/>
+          </a:xfrm>
+        </p:spPr>
+        <p:txBody>
+          <a:bodyPr>
+            <a:normAutofit fontScale="90000"/>
+          </a:bodyPr>
           <a:p>
             <a:r>
               <a:rPr lang="en-US"/>
-              <a:t>Thank you</a:t>
+              <a:t>Monitoring</a:t>
             </a:r>
             <a:endParaRPr lang="en-US"/>
           </a:p>

</xml_diff>